<commit_message>
Ukázky cookie authentication, password hashing, docker kontejnerizace
</commit_message>
<xml_diff>
--- a/netcore/architecture-overview/presentation.pptx
+++ b/netcore/architecture-overview/presentation.pptx
@@ -202,7 +202,7 @@
           <a:p>
             <a:fld id="{B1DDE385-D6AF-476C-9D17-DB9AE5B3CFF2}" type="datetimeFigureOut">
               <a:rPr lang="cs-CZ" smtClean="0"/>
-              <a:t>21.10.2018</a:t>
+              <a:t>24.10.2018</a:t>
             </a:fld>
             <a:endParaRPr lang="cs-CZ"/>
           </a:p>
@@ -784,7 +784,7 @@
           <a:p>
             <a:fld id="{C4DEAF7E-EEED-409B-A17E-58F97852480E}" type="datetimeFigureOut">
               <a:rPr lang="cs-CZ" smtClean="0"/>
-              <a:t>21.10.2018</a:t>
+              <a:t>24.10.2018</a:t>
             </a:fld>
             <a:endParaRPr lang="cs-CZ"/>
           </a:p>
@@ -982,7 +982,7 @@
           <a:p>
             <a:fld id="{C4DEAF7E-EEED-409B-A17E-58F97852480E}" type="datetimeFigureOut">
               <a:rPr lang="cs-CZ" smtClean="0"/>
-              <a:t>21.10.2018</a:t>
+              <a:t>24.10.2018</a:t>
             </a:fld>
             <a:endParaRPr lang="cs-CZ"/>
           </a:p>
@@ -1190,7 +1190,7 @@
           <a:p>
             <a:fld id="{C4DEAF7E-EEED-409B-A17E-58F97852480E}" type="datetimeFigureOut">
               <a:rPr lang="cs-CZ" smtClean="0"/>
-              <a:t>21.10.2018</a:t>
+              <a:t>24.10.2018</a:t>
             </a:fld>
             <a:endParaRPr lang="cs-CZ"/>
           </a:p>
@@ -1388,7 +1388,7 @@
           <a:p>
             <a:fld id="{C4DEAF7E-EEED-409B-A17E-58F97852480E}" type="datetimeFigureOut">
               <a:rPr lang="cs-CZ" smtClean="0"/>
-              <a:t>21.10.2018</a:t>
+              <a:t>24.10.2018</a:t>
             </a:fld>
             <a:endParaRPr lang="cs-CZ"/>
           </a:p>
@@ -1663,7 +1663,7 @@
           <a:p>
             <a:fld id="{C4DEAF7E-EEED-409B-A17E-58F97852480E}" type="datetimeFigureOut">
               <a:rPr lang="cs-CZ" smtClean="0"/>
-              <a:t>21.10.2018</a:t>
+              <a:t>24.10.2018</a:t>
             </a:fld>
             <a:endParaRPr lang="cs-CZ"/>
           </a:p>
@@ -1928,7 +1928,7 @@
           <a:p>
             <a:fld id="{C4DEAF7E-EEED-409B-A17E-58F97852480E}" type="datetimeFigureOut">
               <a:rPr lang="cs-CZ" smtClean="0"/>
-              <a:t>21.10.2018</a:t>
+              <a:t>24.10.2018</a:t>
             </a:fld>
             <a:endParaRPr lang="cs-CZ"/>
           </a:p>
@@ -2340,7 +2340,7 @@
           <a:p>
             <a:fld id="{C4DEAF7E-EEED-409B-A17E-58F97852480E}" type="datetimeFigureOut">
               <a:rPr lang="cs-CZ" smtClean="0"/>
-              <a:t>21.10.2018</a:t>
+              <a:t>24.10.2018</a:t>
             </a:fld>
             <a:endParaRPr lang="cs-CZ"/>
           </a:p>
@@ -2481,7 +2481,7 @@
           <a:p>
             <a:fld id="{C4DEAF7E-EEED-409B-A17E-58F97852480E}" type="datetimeFigureOut">
               <a:rPr lang="cs-CZ" smtClean="0"/>
-              <a:t>21.10.2018</a:t>
+              <a:t>24.10.2018</a:t>
             </a:fld>
             <a:endParaRPr lang="cs-CZ"/>
           </a:p>
@@ -2594,7 +2594,7 @@
           <a:p>
             <a:fld id="{C4DEAF7E-EEED-409B-A17E-58F97852480E}" type="datetimeFigureOut">
               <a:rPr lang="cs-CZ" smtClean="0"/>
-              <a:t>21.10.2018</a:t>
+              <a:t>24.10.2018</a:t>
             </a:fld>
             <a:endParaRPr lang="cs-CZ"/>
           </a:p>
@@ -2905,7 +2905,7 @@
           <a:p>
             <a:fld id="{C4DEAF7E-EEED-409B-A17E-58F97852480E}" type="datetimeFigureOut">
               <a:rPr lang="cs-CZ" smtClean="0"/>
-              <a:t>21.10.2018</a:t>
+              <a:t>24.10.2018</a:t>
             </a:fld>
             <a:endParaRPr lang="cs-CZ"/>
           </a:p>
@@ -3193,7 +3193,7 @@
           <a:p>
             <a:fld id="{C4DEAF7E-EEED-409B-A17E-58F97852480E}" type="datetimeFigureOut">
               <a:rPr lang="cs-CZ" smtClean="0"/>
-              <a:t>21.10.2018</a:t>
+              <a:t>24.10.2018</a:t>
             </a:fld>
             <a:endParaRPr lang="cs-CZ"/>
           </a:p>
@@ -3434,7 +3434,7 @@
           <a:p>
             <a:fld id="{C4DEAF7E-EEED-409B-A17E-58F97852480E}" type="datetimeFigureOut">
               <a:rPr lang="cs-CZ" smtClean="0"/>
-              <a:t>21.10.2018</a:t>
+              <a:t>24.10.2018</a:t>
             </a:fld>
             <a:endParaRPr lang="cs-CZ"/>
           </a:p>
@@ -4118,7 +4118,7 @@
               <a:t>ASP.NET </a:t>
             </a:r>
             <a:r>
-              <a:rPr lang="cs-CZ" sz="5000" b="1" dirty="0" err="1">
+              <a:rPr lang="cs-CZ" sz="5000" b="1">
                 <a:latin typeface="Segoe UI Light" panose="020B0502040204020203" pitchFamily="34" charset="0"/>
                 <a:cs typeface="Segoe UI Light" panose="020B0502040204020203" pitchFamily="34" charset="0"/>
               </a:rPr>

</xml_diff>

<commit_message>
Připojena dema ke školení EF Core (public 08 / 2018)
</commit_message>
<xml_diff>
--- a/netcore/architecture-overview/presentation.pptx
+++ b/netcore/architecture-overview/presentation.pptx
@@ -5,15 +5,13 @@
     <p:sldMasterId id="2147483648" r:id="rId1"/>
   </p:sldMasterIdLst>
   <p:notesMasterIdLst>
-    <p:notesMasterId r:id="rId8"/>
+    <p:notesMasterId r:id="rId6"/>
   </p:notesMasterIdLst>
   <p:sldIdLst>
     <p:sldId id="437" r:id="rId2"/>
     <p:sldId id="449" r:id="rId3"/>
-    <p:sldId id="452" r:id="rId4"/>
-    <p:sldId id="438" r:id="rId5"/>
-    <p:sldId id="451" r:id="rId6"/>
-    <p:sldId id="450" r:id="rId7"/>
+    <p:sldId id="451" r:id="rId4"/>
+    <p:sldId id="450" r:id="rId5"/>
   </p:sldIdLst>
   <p:sldSz cx="12192000" cy="6858000"/>
   <p:notesSz cx="6858000" cy="9144000"/>
@@ -467,174 +465,6 @@
     </a:lvl9pPr>
   </p:notesStyle>
 </p:notesMaster>
-</file>
-
-<file path=ppt/notesSlides/notesSlide1.xml><?xml version="1.0" encoding="utf-8"?>
-<p:notes xmlns:a="http://schemas.openxmlformats.org/drawingml/2006/main" xmlns:r="http://schemas.openxmlformats.org/officeDocument/2006/relationships" xmlns:p="http://schemas.openxmlformats.org/presentationml/2006/main">
-  <p:cSld>
-    <p:spTree>
-      <p:nvGrpSpPr>
-        <p:cNvPr id="1" name=""/>
-        <p:cNvGrpSpPr/>
-        <p:nvPr/>
-      </p:nvGrpSpPr>
-      <p:grpSpPr>
-        <a:xfrm>
-          <a:off x="0" y="0"/>
-          <a:ext cx="0" cy="0"/>
-          <a:chOff x="0" y="0"/>
-          <a:chExt cx="0" cy="0"/>
-        </a:xfrm>
-      </p:grpSpPr>
-      <p:sp>
-        <p:nvSpPr>
-          <p:cNvPr id="2" name="Zástupný symbol pro obrázek snímku 1"/>
-          <p:cNvSpPr>
-            <a:spLocks noGrp="1" noRot="1" noChangeAspect="1"/>
-          </p:cNvSpPr>
-          <p:nvPr>
-            <p:ph type="sldImg"/>
-          </p:nvPr>
-        </p:nvSpPr>
-        <p:spPr/>
-      </p:sp>
-      <p:sp>
-        <p:nvSpPr>
-          <p:cNvPr id="3" name="Zástupný symbol pro poznámky 2"/>
-          <p:cNvSpPr>
-            <a:spLocks noGrp="1"/>
-          </p:cNvSpPr>
-          <p:nvPr>
-            <p:ph type="body" idx="1"/>
-          </p:nvPr>
-        </p:nvSpPr>
-        <p:spPr/>
-        <p:txBody>
-          <a:bodyPr/>
-          <a:lstStyle/>
-          <a:p>
-            <a:endParaRPr lang="cs-CZ"/>
-          </a:p>
-        </p:txBody>
-      </p:sp>
-      <p:sp>
-        <p:nvSpPr>
-          <p:cNvPr id="4" name="Zástupný symbol pro číslo snímku 3"/>
-          <p:cNvSpPr>
-            <a:spLocks noGrp="1"/>
-          </p:cNvSpPr>
-          <p:nvPr>
-            <p:ph type="sldNum" sz="quarter" idx="10"/>
-          </p:nvPr>
-        </p:nvSpPr>
-        <p:spPr/>
-        <p:txBody>
-          <a:bodyPr/>
-          <a:lstStyle/>
-          <a:p>
-            <a:fld id="{1F9A7BC3-B421-454C-8A99-BC88655F49D3}" type="slidenum">
-              <a:rPr lang="cs-CZ" smtClean="0"/>
-              <a:t>3</a:t>
-            </a:fld>
-            <a:endParaRPr lang="cs-CZ"/>
-          </a:p>
-        </p:txBody>
-      </p:sp>
-    </p:spTree>
-    <p:extLst>
-      <p:ext uri="{BB962C8B-B14F-4D97-AF65-F5344CB8AC3E}">
-        <p14:creationId xmlns:p14="http://schemas.microsoft.com/office/powerpoint/2010/main" val="566749639"/>
-      </p:ext>
-    </p:extLst>
-  </p:cSld>
-  <p:clrMapOvr>
-    <a:masterClrMapping/>
-  </p:clrMapOvr>
-</p:notes>
-</file>
-
-<file path=ppt/notesSlides/notesSlide2.xml><?xml version="1.0" encoding="utf-8"?>
-<p:notes xmlns:a="http://schemas.openxmlformats.org/drawingml/2006/main" xmlns:r="http://schemas.openxmlformats.org/officeDocument/2006/relationships" xmlns:p="http://schemas.openxmlformats.org/presentationml/2006/main">
-  <p:cSld>
-    <p:spTree>
-      <p:nvGrpSpPr>
-        <p:cNvPr id="1" name=""/>
-        <p:cNvGrpSpPr/>
-        <p:nvPr/>
-      </p:nvGrpSpPr>
-      <p:grpSpPr>
-        <a:xfrm>
-          <a:off x="0" y="0"/>
-          <a:ext cx="0" cy="0"/>
-          <a:chOff x="0" y="0"/>
-          <a:chExt cx="0" cy="0"/>
-        </a:xfrm>
-      </p:grpSpPr>
-      <p:sp>
-        <p:nvSpPr>
-          <p:cNvPr id="2" name="Zástupný symbol pro obrázek snímku 1"/>
-          <p:cNvSpPr>
-            <a:spLocks noGrp="1" noRot="1" noChangeAspect="1"/>
-          </p:cNvSpPr>
-          <p:nvPr>
-            <p:ph type="sldImg"/>
-          </p:nvPr>
-        </p:nvSpPr>
-        <p:spPr/>
-      </p:sp>
-      <p:sp>
-        <p:nvSpPr>
-          <p:cNvPr id="3" name="Zástupný symbol pro poznámky 2"/>
-          <p:cNvSpPr>
-            <a:spLocks noGrp="1"/>
-          </p:cNvSpPr>
-          <p:nvPr>
-            <p:ph type="body" idx="1"/>
-          </p:nvPr>
-        </p:nvSpPr>
-        <p:spPr/>
-        <p:txBody>
-          <a:bodyPr/>
-          <a:lstStyle/>
-          <a:p>
-            <a:endParaRPr lang="cs-CZ"/>
-          </a:p>
-        </p:txBody>
-      </p:sp>
-      <p:sp>
-        <p:nvSpPr>
-          <p:cNvPr id="4" name="Zástupný symbol pro číslo snímku 3"/>
-          <p:cNvSpPr>
-            <a:spLocks noGrp="1"/>
-          </p:cNvSpPr>
-          <p:nvPr>
-            <p:ph type="sldNum" sz="quarter" idx="10"/>
-          </p:nvPr>
-        </p:nvSpPr>
-        <p:spPr/>
-        <p:txBody>
-          <a:bodyPr/>
-          <a:lstStyle/>
-          <a:p>
-            <a:fld id="{1F9A7BC3-B421-454C-8A99-BC88655F49D3}" type="slidenum">
-              <a:rPr lang="cs-CZ" smtClean="0"/>
-              <a:t>4</a:t>
-            </a:fld>
-            <a:endParaRPr lang="cs-CZ"/>
-          </a:p>
-        </p:txBody>
-      </p:sp>
-    </p:spTree>
-    <p:extLst>
-      <p:ext uri="{BB962C8B-B14F-4D97-AF65-F5344CB8AC3E}">
-        <p14:creationId xmlns:p14="http://schemas.microsoft.com/office/powerpoint/2010/main" val="2218545965"/>
-      </p:ext>
-    </p:extLst>
-  </p:cSld>
-  <p:clrMapOvr>
-    <a:masterClrMapping/>
-  </p:clrMapOvr>
-</p:notes>
 </file>
 
 <file path=ppt/slideLayouts/slideLayout1.xml><?xml version="1.0" encoding="utf-8"?>
@@ -6661,835 +6491,6 @@
 </file>
 
 <file path=ppt/slides/slide3.xml><?xml version="1.0" encoding="utf-8"?>
-<p:sld xmlns:a="http://schemas.openxmlformats.org/drawingml/2006/main" xmlns:r="http://schemas.openxmlformats.org/officeDocument/2006/relationships" xmlns:p="http://schemas.openxmlformats.org/presentationml/2006/main">
-  <p:cSld>
-    <p:spTree>
-      <p:nvGrpSpPr>
-        <p:cNvPr id="1" name=""/>
-        <p:cNvGrpSpPr/>
-        <p:nvPr/>
-      </p:nvGrpSpPr>
-      <p:grpSpPr>
-        <a:xfrm>
-          <a:off x="0" y="0"/>
-          <a:ext cx="0" cy="0"/>
-          <a:chOff x="0" y="0"/>
-          <a:chExt cx="0" cy="0"/>
-        </a:xfrm>
-      </p:grpSpPr>
-      <p:pic>
-        <p:nvPicPr>
-          <p:cNvPr id="8194" name="Picture 2" descr="https://cdn.miroslavholec.cz/articles/2018/netstandard-prehled-verzi.png">
-            <a:extLst>
-              <a:ext uri="{FF2B5EF4-FFF2-40B4-BE49-F238E27FC236}">
-                <a16:creationId xmlns:a16="http://schemas.microsoft.com/office/drawing/2014/main" id="{39430CE0-7417-40F2-9E76-FA1A8BA84893}"/>
-              </a:ext>
-            </a:extLst>
-          </p:cNvPr>
-          <p:cNvPicPr>
-            <a:picLocks noChangeAspect="1" noChangeArrowheads="1"/>
-          </p:cNvPicPr>
-          <p:nvPr/>
-        </p:nvPicPr>
-        <p:blipFill>
-          <a:blip r:embed="rId3">
-            <a:extLst>
-              <a:ext uri="{28A0092B-C50C-407E-A947-70E740481C1C}">
-                <a14:useLocalDpi xmlns:a14="http://schemas.microsoft.com/office/drawing/2010/main" val="0"/>
-              </a:ext>
-            </a:extLst>
-          </a:blip>
-          <a:srcRect/>
-          <a:stretch>
-            <a:fillRect/>
-          </a:stretch>
-        </p:blipFill>
-        <p:spPr bwMode="auto">
-          <a:xfrm>
-            <a:off x="901699" y="2709138"/>
-            <a:ext cx="9853639" cy="2589379"/>
-          </a:xfrm>
-          <a:prstGeom prst="rect">
-            <a:avLst/>
-          </a:prstGeom>
-          <a:noFill/>
-          <a:extLst>
-            <a:ext uri="{909E8E84-426E-40DD-AFC4-6F175D3DCCD1}">
-              <a14:hiddenFill xmlns:a14="http://schemas.microsoft.com/office/drawing/2010/main">
-                <a:solidFill>
-                  <a:srgbClr val="FFFFFF"/>
-                </a:solidFill>
-              </a14:hiddenFill>
-            </a:ext>
-          </a:extLst>
-        </p:spPr>
-      </p:pic>
-      <p:sp>
-        <p:nvSpPr>
-          <p:cNvPr id="16" name="TextBox 18">
-            <a:extLst>
-              <a:ext uri="{FF2B5EF4-FFF2-40B4-BE49-F238E27FC236}">
-                <a16:creationId xmlns:a16="http://schemas.microsoft.com/office/drawing/2014/main" id="{9598EACC-43EF-4CAA-B1FC-9EBCE496A588}"/>
-              </a:ext>
-            </a:extLst>
-          </p:cNvPr>
-          <p:cNvSpPr txBox="1"/>
-          <p:nvPr/>
-        </p:nvSpPr>
-        <p:spPr>
-          <a:xfrm>
-            <a:off x="5512991" y="1871218"/>
-            <a:ext cx="2450828" cy="359201"/>
-          </a:xfrm>
-          <a:prstGeom prst="rect">
-            <a:avLst/>
-          </a:prstGeom>
-          <a:noFill/>
-        </p:spPr>
-        <p:txBody>
-          <a:bodyPr wrap="square" rtlCol="0">
-            <a:spAutoFit/>
-          </a:bodyPr>
-          <a:lstStyle/>
-          <a:p>
-            <a:pPr algn="ctr">
-              <a:lnSpc>
-                <a:spcPct val="140000"/>
-              </a:lnSpc>
-            </a:pPr>
-            <a:r>
-              <a:rPr lang="cs-CZ" sz="1400" b="1" dirty="0">
-                <a:latin typeface="Segoe UI Semilight" panose="020B0402040204020203" pitchFamily="34" charset="0"/>
-                <a:cs typeface="Segoe UI Semilight" panose="020B0402040204020203" pitchFamily="34" charset="0"/>
-              </a:rPr>
-              <a:t>13k </a:t>
-            </a:r>
-            <a:r>
-              <a:rPr lang="cs-CZ" sz="1400" b="1" dirty="0" err="1">
-                <a:latin typeface="Segoe UI Semilight" panose="020B0402040204020203" pitchFamily="34" charset="0"/>
-                <a:cs typeface="Segoe UI Semilight" panose="020B0402040204020203" pitchFamily="34" charset="0"/>
-              </a:rPr>
-              <a:t>APIs</a:t>
-            </a:r>
-            <a:endParaRPr lang="cs-CZ" sz="1400" b="1" dirty="0">
-              <a:latin typeface="Segoe UI Semilight" panose="020B0402040204020203" pitchFamily="34" charset="0"/>
-              <a:cs typeface="Segoe UI Semilight" panose="020B0402040204020203" pitchFamily="34" charset="0"/>
-            </a:endParaRPr>
-          </a:p>
-        </p:txBody>
-      </p:sp>
-      <p:sp>
-        <p:nvSpPr>
-          <p:cNvPr id="2" name="Obdélník 1">
-            <a:extLst>
-              <a:ext uri="{FF2B5EF4-FFF2-40B4-BE49-F238E27FC236}">
-                <a16:creationId xmlns:a16="http://schemas.microsoft.com/office/drawing/2014/main" id="{413DECB9-37EC-4B60-AB7F-8D6A186D4F51}"/>
-              </a:ext>
-            </a:extLst>
-          </p:cNvPr>
-          <p:cNvSpPr/>
-          <p:nvPr/>
-        </p:nvSpPr>
-        <p:spPr>
-          <a:xfrm>
-            <a:off x="9829800" y="1871217"/>
-            <a:ext cx="863600" cy="4292699"/>
-          </a:xfrm>
-          <a:prstGeom prst="rect">
-            <a:avLst/>
-          </a:prstGeom>
-          <a:solidFill>
-            <a:srgbClr val="FFC000">
-              <a:alpha val="38824"/>
-            </a:srgbClr>
-          </a:solidFill>
-          <a:ln>
-            <a:noFill/>
-          </a:ln>
-        </p:spPr>
-        <p:style>
-          <a:lnRef idx="2">
-            <a:schemeClr val="accent1">
-              <a:shade val="50000"/>
-            </a:schemeClr>
-          </a:lnRef>
-          <a:fillRef idx="1">
-            <a:schemeClr val="accent1"/>
-          </a:fillRef>
-          <a:effectRef idx="0">
-            <a:schemeClr val="accent1"/>
-          </a:effectRef>
-          <a:fontRef idx="minor">
-            <a:schemeClr val="lt1"/>
-          </a:fontRef>
-        </p:style>
-        <p:txBody>
-          <a:bodyPr rtlCol="0" anchor="ctr"/>
-          <a:lstStyle/>
-          <a:p>
-            <a:pPr algn="ctr"/>
-            <a:endParaRPr lang="cs-CZ"/>
-          </a:p>
-        </p:txBody>
-      </p:sp>
-      <p:sp>
-        <p:nvSpPr>
-          <p:cNvPr id="8" name="TextBox 18">
-            <a:extLst>
-              <a:ext uri="{FF2B5EF4-FFF2-40B4-BE49-F238E27FC236}">
-                <a16:creationId xmlns:a16="http://schemas.microsoft.com/office/drawing/2014/main" id="{5435CD77-5691-3042-9700-5B6742EE955D}"/>
-              </a:ext>
-            </a:extLst>
-          </p:cNvPr>
-          <p:cNvSpPr txBox="1"/>
-          <p:nvPr/>
-        </p:nvSpPr>
-        <p:spPr>
-          <a:xfrm>
-            <a:off x="9031328" y="1871218"/>
-            <a:ext cx="2450828" cy="359201"/>
-          </a:xfrm>
-          <a:prstGeom prst="rect">
-            <a:avLst/>
-          </a:prstGeom>
-          <a:noFill/>
-        </p:spPr>
-        <p:txBody>
-          <a:bodyPr wrap="square" rtlCol="0">
-            <a:spAutoFit/>
-          </a:bodyPr>
-          <a:lstStyle/>
-          <a:p>
-            <a:pPr algn="ctr">
-              <a:lnSpc>
-                <a:spcPct val="140000"/>
-              </a:lnSpc>
-            </a:pPr>
-            <a:r>
-              <a:rPr lang="cs-CZ" sz="1400" b="1" dirty="0">
-                <a:latin typeface="Segoe UI Semilight" panose="020B0402040204020203" pitchFamily="34" charset="0"/>
-                <a:cs typeface="Segoe UI Semilight" panose="020B0402040204020203" pitchFamily="34" charset="0"/>
-              </a:rPr>
-              <a:t>32k </a:t>
-            </a:r>
-            <a:r>
-              <a:rPr lang="cs-CZ" sz="1400" b="1" dirty="0" err="1">
-                <a:latin typeface="Segoe UI Semilight" panose="020B0402040204020203" pitchFamily="34" charset="0"/>
-                <a:cs typeface="Segoe UI Semilight" panose="020B0402040204020203" pitchFamily="34" charset="0"/>
-              </a:rPr>
-              <a:t>APIs</a:t>
-            </a:r>
-            <a:endParaRPr lang="cs-CZ" sz="1400" b="1" dirty="0">
-              <a:latin typeface="Segoe UI Semilight" panose="020B0402040204020203" pitchFamily="34" charset="0"/>
-              <a:cs typeface="Segoe UI Semilight" panose="020B0402040204020203" pitchFamily="34" charset="0"/>
-            </a:endParaRPr>
-          </a:p>
-        </p:txBody>
-      </p:sp>
-      <p:sp>
-        <p:nvSpPr>
-          <p:cNvPr id="9" name="TextovéPole 8">
-            <a:extLst>
-              <a:ext uri="{FF2B5EF4-FFF2-40B4-BE49-F238E27FC236}">
-                <a16:creationId xmlns:a16="http://schemas.microsoft.com/office/drawing/2014/main" id="{0939F7F6-172C-42CA-B2AD-104F411CC905}"/>
-              </a:ext>
-            </a:extLst>
-          </p:cNvPr>
-          <p:cNvSpPr txBox="1"/>
-          <p:nvPr/>
-        </p:nvSpPr>
-        <p:spPr>
-          <a:xfrm>
-            <a:off x="0" y="380137"/>
-            <a:ext cx="12192000" cy="276999"/>
-          </a:xfrm>
-          <a:prstGeom prst="rect">
-            <a:avLst/>
-          </a:prstGeom>
-          <a:noFill/>
-        </p:spPr>
-        <p:txBody>
-          <a:bodyPr wrap="square" rtlCol="0">
-            <a:spAutoFit/>
-          </a:bodyPr>
-          <a:lstStyle/>
-          <a:p>
-            <a:pPr algn="ctr"/>
-            <a:r>
-              <a:rPr lang="cs-CZ" sz="1200" b="1" dirty="0">
-                <a:latin typeface="Segoe UI" panose="020B0502040204020203" pitchFamily="34" charset="0"/>
-                <a:cs typeface="Segoe UI" panose="020B0502040204020203" pitchFamily="34" charset="0"/>
-              </a:rPr>
-              <a:t>.NET STANDARD</a:t>
-            </a:r>
-          </a:p>
-        </p:txBody>
-      </p:sp>
-    </p:spTree>
-    <p:extLst>
-      <p:ext uri="{BB962C8B-B14F-4D97-AF65-F5344CB8AC3E}">
-        <p14:creationId xmlns:p14="http://schemas.microsoft.com/office/powerpoint/2010/main" val="1203692821"/>
-      </p:ext>
-    </p:extLst>
-  </p:cSld>
-  <p:clrMapOvr>
-    <a:masterClrMapping/>
-  </p:clrMapOvr>
-  <mc:AlternateContent xmlns:mc="http://schemas.openxmlformats.org/markup-compatibility/2006" xmlns:p14="http://schemas.microsoft.com/office/powerpoint/2010/main">
-    <mc:Choice Requires="p14">
-      <p:transition spd="slow" p14:dur="1300">
-        <p14:pan dir="u"/>
-      </p:transition>
-    </mc:Choice>
-    <mc:Fallback xmlns="">
-      <p:transition spd="slow">
-        <p:fade/>
-      </p:transition>
-    </mc:Fallback>
-  </mc:AlternateContent>
-  <p:timing>
-    <p:tnLst>
-      <p:par>
-        <p:cTn id="1" dur="indefinite" restart="never" nodeType="tmRoot">
-          <p:childTnLst>
-            <p:seq concurrent="1" nextAc="seek">
-              <p:cTn id="2" dur="indefinite" nodeType="mainSeq">
-                <p:childTnLst>
-                  <p:par>
-                    <p:cTn id="3" fill="hold">
-                      <p:stCondLst>
-                        <p:cond delay="indefinite"/>
-                      </p:stCondLst>
-                      <p:childTnLst>
-                        <p:par>
-                          <p:cTn id="4" fill="hold">
-                            <p:stCondLst>
-                              <p:cond delay="0"/>
-                            </p:stCondLst>
-                            <p:childTnLst>
-                              <p:par>
-                                <p:cTn id="5" presetID="10" presetClass="entr" presetSubtype="0" fill="hold" grpId="0" nodeType="clickEffect">
-                                  <p:stCondLst>
-                                    <p:cond delay="0"/>
-                                  </p:stCondLst>
-                                  <p:childTnLst>
-                                    <p:set>
-                                      <p:cBhvr>
-                                        <p:cTn id="6" dur="1" fill="hold">
-                                          <p:stCondLst>
-                                            <p:cond delay="0"/>
-                                          </p:stCondLst>
-                                        </p:cTn>
-                                        <p:tgtEl>
-                                          <p:spTgt spid="2"/>
-                                        </p:tgtEl>
-                                        <p:attrNameLst>
-                                          <p:attrName>style.visibility</p:attrName>
-                                        </p:attrNameLst>
-                                      </p:cBhvr>
-                                      <p:to>
-                                        <p:strVal val="visible"/>
-                                      </p:to>
-                                    </p:set>
-                                    <p:animEffect transition="in" filter="fade">
-                                      <p:cBhvr>
-                                        <p:cTn id="7" dur="500"/>
-                                        <p:tgtEl>
-                                          <p:spTgt spid="2"/>
-                                        </p:tgtEl>
-                                      </p:cBhvr>
-                                    </p:animEffect>
-                                  </p:childTnLst>
-                                </p:cTn>
-                              </p:par>
-                            </p:childTnLst>
-                          </p:cTn>
-                        </p:par>
-                      </p:childTnLst>
-                    </p:cTn>
-                  </p:par>
-                </p:childTnLst>
-              </p:cTn>
-              <p:prevCondLst>
-                <p:cond evt="onPrev" delay="0">
-                  <p:tgtEl>
-                    <p:sldTgt/>
-                  </p:tgtEl>
-                </p:cond>
-              </p:prevCondLst>
-              <p:nextCondLst>
-                <p:cond evt="onNext" delay="0">
-                  <p:tgtEl>
-                    <p:sldTgt/>
-                  </p:tgtEl>
-                </p:cond>
-              </p:nextCondLst>
-            </p:seq>
-          </p:childTnLst>
-        </p:cTn>
-      </p:par>
-    </p:tnLst>
-    <p:bldLst>
-      <p:bldP spid="2" grpId="0" animBg="1"/>
-    </p:bldLst>
-  </p:timing>
-</p:sld>
-</file>
-
-<file path=ppt/slides/slide4.xml><?xml version="1.0" encoding="utf-8"?>
-<p:sld xmlns:a="http://schemas.openxmlformats.org/drawingml/2006/main" xmlns:r="http://schemas.openxmlformats.org/officeDocument/2006/relationships" xmlns:p="http://schemas.openxmlformats.org/presentationml/2006/main">
-  <p:cSld>
-    <p:spTree>
-      <p:nvGrpSpPr>
-        <p:cNvPr id="1" name=""/>
-        <p:cNvGrpSpPr/>
-        <p:nvPr/>
-      </p:nvGrpSpPr>
-      <p:grpSpPr>
-        <a:xfrm>
-          <a:off x="0" y="0"/>
-          <a:ext cx="0" cy="0"/>
-          <a:chOff x="0" y="0"/>
-          <a:chExt cx="0" cy="0"/>
-        </a:xfrm>
-      </p:grpSpPr>
-      <p:pic>
-        <p:nvPicPr>
-          <p:cNvPr id="8194" name="Picture 2" descr="https://cdn.miroslavholec.cz/articles/2018/netstandard-prehled-verzi.png">
-            <a:extLst>
-              <a:ext uri="{FF2B5EF4-FFF2-40B4-BE49-F238E27FC236}">
-                <a16:creationId xmlns:a16="http://schemas.microsoft.com/office/drawing/2014/main" id="{39430CE0-7417-40F2-9E76-FA1A8BA84893}"/>
-              </a:ext>
-            </a:extLst>
-          </p:cNvPr>
-          <p:cNvPicPr>
-            <a:picLocks noChangeAspect="1" noChangeArrowheads="1"/>
-          </p:cNvPicPr>
-          <p:nvPr/>
-        </p:nvPicPr>
-        <p:blipFill>
-          <a:blip r:embed="rId3">
-            <a:extLst>
-              <a:ext uri="{28A0092B-C50C-407E-A947-70E740481C1C}">
-                <a14:useLocalDpi xmlns:a14="http://schemas.microsoft.com/office/drawing/2010/main" val="0"/>
-              </a:ext>
-            </a:extLst>
-          </a:blip>
-          <a:srcRect/>
-          <a:stretch>
-            <a:fillRect/>
-          </a:stretch>
-        </p:blipFill>
-        <p:spPr bwMode="auto">
-          <a:xfrm>
-            <a:off x="901699" y="2709138"/>
-            <a:ext cx="9853639" cy="2589379"/>
-          </a:xfrm>
-          <a:prstGeom prst="rect">
-            <a:avLst/>
-          </a:prstGeom>
-          <a:noFill/>
-          <a:extLst>
-            <a:ext uri="{909E8E84-426E-40DD-AFC4-6F175D3DCCD1}">
-              <a14:hiddenFill xmlns:a14="http://schemas.microsoft.com/office/drawing/2010/main">
-                <a:solidFill>
-                  <a:srgbClr val="FFFFFF"/>
-                </a:solidFill>
-              </a14:hiddenFill>
-            </a:ext>
-          </a:extLst>
-        </p:spPr>
-      </p:pic>
-      <p:sp>
-        <p:nvSpPr>
-          <p:cNvPr id="10" name="Obdélník 9">
-            <a:extLst>
-              <a:ext uri="{FF2B5EF4-FFF2-40B4-BE49-F238E27FC236}">
-                <a16:creationId xmlns:a16="http://schemas.microsoft.com/office/drawing/2014/main" id="{47C5D900-949D-4646-9B09-257D5F7CA075}"/>
-              </a:ext>
-            </a:extLst>
-          </p:cNvPr>
-          <p:cNvSpPr/>
-          <p:nvPr/>
-        </p:nvSpPr>
-        <p:spPr>
-          <a:xfrm>
-            <a:off x="7213599" y="3035300"/>
-            <a:ext cx="3510769" cy="2179985"/>
-          </a:xfrm>
-          <a:prstGeom prst="rect">
-            <a:avLst/>
-          </a:prstGeom>
-          <a:solidFill>
-            <a:srgbClr val="FFC000">
-              <a:alpha val="38824"/>
-            </a:srgbClr>
-          </a:solidFill>
-          <a:ln>
-            <a:noFill/>
-          </a:ln>
-        </p:spPr>
-        <p:style>
-          <a:lnRef idx="2">
-            <a:schemeClr val="accent1">
-              <a:shade val="50000"/>
-            </a:schemeClr>
-          </a:lnRef>
-          <a:fillRef idx="1">
-            <a:schemeClr val="accent1"/>
-          </a:fillRef>
-          <a:effectRef idx="0">
-            <a:schemeClr val="accent1"/>
-          </a:effectRef>
-          <a:fontRef idx="minor">
-            <a:schemeClr val="lt1"/>
-          </a:fontRef>
-        </p:style>
-        <p:txBody>
-          <a:bodyPr rtlCol="0" anchor="ctr"/>
-          <a:lstStyle/>
-          <a:p>
-            <a:pPr algn="ctr"/>
-            <a:endParaRPr lang="cs-CZ"/>
-          </a:p>
-        </p:txBody>
-      </p:sp>
-      <p:cxnSp>
-        <p:nvCxnSpPr>
-          <p:cNvPr id="4" name="Přímá spojnice se šipkou 3">
-            <a:extLst>
-              <a:ext uri="{FF2B5EF4-FFF2-40B4-BE49-F238E27FC236}">
-                <a16:creationId xmlns:a16="http://schemas.microsoft.com/office/drawing/2014/main" id="{632F9210-7D3D-42EA-867C-AAF498DFA181}"/>
-              </a:ext>
-            </a:extLst>
-          </p:cNvPr>
-          <p:cNvCxnSpPr/>
-          <p:nvPr/>
-        </p:nvCxnSpPr>
-        <p:spPr>
-          <a:xfrm>
-            <a:off x="6286500" y="5461000"/>
-            <a:ext cx="3962400" cy="0"/>
-          </a:xfrm>
-          <a:prstGeom prst="straightConnector1">
-            <a:avLst/>
-          </a:prstGeom>
-          <a:ln w="76200">
-            <a:tailEnd type="triangle"/>
-          </a:ln>
-        </p:spPr>
-        <p:style>
-          <a:lnRef idx="1">
-            <a:schemeClr val="accent2"/>
-          </a:lnRef>
-          <a:fillRef idx="0">
-            <a:schemeClr val="accent2"/>
-          </a:fillRef>
-          <a:effectRef idx="0">
-            <a:schemeClr val="accent2"/>
-          </a:effectRef>
-          <a:fontRef idx="minor">
-            <a:schemeClr val="tx1"/>
-          </a:fontRef>
-        </p:style>
-      </p:cxnSp>
-      <p:sp>
-        <p:nvSpPr>
-          <p:cNvPr id="2" name="Obdélník 1">
-            <a:extLst>
-              <a:ext uri="{FF2B5EF4-FFF2-40B4-BE49-F238E27FC236}">
-                <a16:creationId xmlns:a16="http://schemas.microsoft.com/office/drawing/2014/main" id="{413DECB9-37EC-4B60-AB7F-8D6A186D4F51}"/>
-              </a:ext>
-            </a:extLst>
-          </p:cNvPr>
-          <p:cNvSpPr/>
-          <p:nvPr/>
-        </p:nvSpPr>
-        <p:spPr>
-          <a:xfrm>
-            <a:off x="6286500" y="1871217"/>
-            <a:ext cx="927099" cy="4292699"/>
-          </a:xfrm>
-          <a:prstGeom prst="rect">
-            <a:avLst/>
-          </a:prstGeom>
-          <a:solidFill>
-            <a:srgbClr val="FFC000">
-              <a:alpha val="38824"/>
-            </a:srgbClr>
-          </a:solidFill>
-          <a:ln>
-            <a:noFill/>
-          </a:ln>
-        </p:spPr>
-        <p:style>
-          <a:lnRef idx="2">
-            <a:schemeClr val="accent1">
-              <a:shade val="50000"/>
-            </a:schemeClr>
-          </a:lnRef>
-          <a:fillRef idx="1">
-            <a:schemeClr val="accent1"/>
-          </a:fillRef>
-          <a:effectRef idx="0">
-            <a:schemeClr val="accent1"/>
-          </a:effectRef>
-          <a:fontRef idx="minor">
-            <a:schemeClr val="lt1"/>
-          </a:fontRef>
-        </p:style>
-        <p:txBody>
-          <a:bodyPr rtlCol="0" anchor="ctr"/>
-          <a:lstStyle/>
-          <a:p>
-            <a:pPr algn="ctr"/>
-            <a:endParaRPr lang="cs-CZ"/>
-          </a:p>
-        </p:txBody>
-      </p:sp>
-      <p:sp>
-        <p:nvSpPr>
-          <p:cNvPr id="11" name="TextBox 18">
-            <a:extLst>
-              <a:ext uri="{FF2B5EF4-FFF2-40B4-BE49-F238E27FC236}">
-                <a16:creationId xmlns:a16="http://schemas.microsoft.com/office/drawing/2014/main" id="{291245A4-1116-0848-84ED-96D5ABA83391}"/>
-              </a:ext>
-            </a:extLst>
-          </p:cNvPr>
-          <p:cNvSpPr txBox="1"/>
-          <p:nvPr/>
-        </p:nvSpPr>
-        <p:spPr>
-          <a:xfrm>
-            <a:off x="5512991" y="1871218"/>
-            <a:ext cx="2450828" cy="359201"/>
-          </a:xfrm>
-          <a:prstGeom prst="rect">
-            <a:avLst/>
-          </a:prstGeom>
-          <a:noFill/>
-        </p:spPr>
-        <p:txBody>
-          <a:bodyPr wrap="square" rtlCol="0">
-            <a:spAutoFit/>
-          </a:bodyPr>
-          <a:lstStyle/>
-          <a:p>
-            <a:pPr algn="ctr">
-              <a:lnSpc>
-                <a:spcPct val="140000"/>
-              </a:lnSpc>
-            </a:pPr>
-            <a:r>
-              <a:rPr lang="cs-CZ" sz="1400" b="1" dirty="0">
-                <a:latin typeface="Segoe UI Semilight" panose="020B0402040204020203" pitchFamily="34" charset="0"/>
-                <a:cs typeface="Segoe UI Semilight" panose="020B0402040204020203" pitchFamily="34" charset="0"/>
-              </a:rPr>
-              <a:t>13k </a:t>
-            </a:r>
-            <a:r>
-              <a:rPr lang="cs-CZ" sz="1400" b="1" dirty="0" err="1">
-                <a:latin typeface="Segoe UI Semilight" panose="020B0402040204020203" pitchFamily="34" charset="0"/>
-                <a:cs typeface="Segoe UI Semilight" panose="020B0402040204020203" pitchFamily="34" charset="0"/>
-              </a:rPr>
-              <a:t>APIs</a:t>
-            </a:r>
-            <a:endParaRPr lang="cs-CZ" sz="1400" b="1" dirty="0">
-              <a:latin typeface="Segoe UI Semilight" panose="020B0402040204020203" pitchFamily="34" charset="0"/>
-              <a:cs typeface="Segoe UI Semilight" panose="020B0402040204020203" pitchFamily="34" charset="0"/>
-            </a:endParaRPr>
-          </a:p>
-        </p:txBody>
-      </p:sp>
-      <p:sp>
-        <p:nvSpPr>
-          <p:cNvPr id="9" name="TextovéPole 8">
-            <a:extLst>
-              <a:ext uri="{FF2B5EF4-FFF2-40B4-BE49-F238E27FC236}">
-                <a16:creationId xmlns:a16="http://schemas.microsoft.com/office/drawing/2014/main" id="{1F295AD6-9AA6-41E8-AC86-B8459445C12D}"/>
-              </a:ext>
-            </a:extLst>
-          </p:cNvPr>
-          <p:cNvSpPr txBox="1"/>
-          <p:nvPr/>
-        </p:nvSpPr>
-        <p:spPr>
-          <a:xfrm>
-            <a:off x="0" y="380137"/>
-            <a:ext cx="12192000" cy="276999"/>
-          </a:xfrm>
-          <a:prstGeom prst="rect">
-            <a:avLst/>
-          </a:prstGeom>
-          <a:noFill/>
-        </p:spPr>
-        <p:txBody>
-          <a:bodyPr wrap="square" rtlCol="0">
-            <a:spAutoFit/>
-          </a:bodyPr>
-          <a:lstStyle/>
-          <a:p>
-            <a:pPr algn="ctr"/>
-            <a:r>
-              <a:rPr lang="cs-CZ" sz="1200" b="1" dirty="0">
-                <a:latin typeface="Segoe UI" panose="020B0502040204020203" pitchFamily="34" charset="0"/>
-                <a:cs typeface="Segoe UI" panose="020B0502040204020203" pitchFamily="34" charset="0"/>
-              </a:rPr>
-              <a:t>.NET STANDARD</a:t>
-            </a:r>
-          </a:p>
-        </p:txBody>
-      </p:sp>
-    </p:spTree>
-    <p:extLst>
-      <p:ext uri="{BB962C8B-B14F-4D97-AF65-F5344CB8AC3E}">
-        <p14:creationId xmlns:p14="http://schemas.microsoft.com/office/powerpoint/2010/main" val="2210692427"/>
-      </p:ext>
-    </p:extLst>
-  </p:cSld>
-  <p:clrMapOvr>
-    <a:masterClrMapping/>
-  </p:clrMapOvr>
-  <mc:AlternateContent xmlns:mc="http://schemas.openxmlformats.org/markup-compatibility/2006" xmlns:p14="http://schemas.microsoft.com/office/powerpoint/2010/main">
-    <mc:Choice Requires="p14">
-      <p:transition spd="med" p14:dur="700">
-        <p:fade/>
-      </p:transition>
-    </mc:Choice>
-    <mc:Fallback xmlns="">
-      <p:transition spd="med">
-        <p:fade/>
-      </p:transition>
-    </mc:Fallback>
-  </mc:AlternateContent>
-  <p:timing>
-    <p:tnLst>
-      <p:par>
-        <p:cTn id="1" dur="indefinite" restart="never" nodeType="tmRoot">
-          <p:childTnLst>
-            <p:seq concurrent="1" nextAc="seek">
-              <p:cTn id="2" dur="indefinite" nodeType="mainSeq">
-                <p:childTnLst>
-                  <p:par>
-                    <p:cTn id="3" fill="hold">
-                      <p:stCondLst>
-                        <p:cond delay="indefinite"/>
-                        <p:cond evt="onBegin" delay="0">
-                          <p:tn val="2"/>
-                        </p:cond>
-                      </p:stCondLst>
-                      <p:childTnLst>
-                        <p:par>
-                          <p:cTn id="4" fill="hold">
-                            <p:stCondLst>
-                              <p:cond delay="0"/>
-                            </p:stCondLst>
-                            <p:childTnLst>
-                              <p:par>
-                                <p:cTn id="5" presetID="22" presetClass="entr" presetSubtype="8" fill="hold" grpId="0" nodeType="withEffect">
-                                  <p:stCondLst>
-                                    <p:cond delay="0"/>
-                                  </p:stCondLst>
-                                  <p:childTnLst>
-                                    <p:set>
-                                      <p:cBhvr>
-                                        <p:cTn id="6" dur="1" fill="hold">
-                                          <p:stCondLst>
-                                            <p:cond delay="0"/>
-                                          </p:stCondLst>
-                                        </p:cTn>
-                                        <p:tgtEl>
-                                          <p:spTgt spid="10"/>
-                                        </p:tgtEl>
-                                        <p:attrNameLst>
-                                          <p:attrName>style.visibility</p:attrName>
-                                        </p:attrNameLst>
-                                      </p:cBhvr>
-                                      <p:to>
-                                        <p:strVal val="visible"/>
-                                      </p:to>
-                                    </p:set>
-                                    <p:animEffect transition="in" filter="wipe(left)">
-                                      <p:cBhvr>
-                                        <p:cTn id="7" dur="500"/>
-                                        <p:tgtEl>
-                                          <p:spTgt spid="10"/>
-                                        </p:tgtEl>
-                                      </p:cBhvr>
-                                    </p:animEffect>
-                                  </p:childTnLst>
-                                </p:cTn>
-                              </p:par>
-                              <p:par>
-                                <p:cTn id="8" presetID="22" presetClass="entr" presetSubtype="8" fill="hold" nodeType="withEffect">
-                                  <p:stCondLst>
-                                    <p:cond delay="0"/>
-                                  </p:stCondLst>
-                                  <p:childTnLst>
-                                    <p:set>
-                                      <p:cBhvr>
-                                        <p:cTn id="9" dur="1" fill="hold">
-                                          <p:stCondLst>
-                                            <p:cond delay="0"/>
-                                          </p:stCondLst>
-                                        </p:cTn>
-                                        <p:tgtEl>
-                                          <p:spTgt spid="4"/>
-                                        </p:tgtEl>
-                                        <p:attrNameLst>
-                                          <p:attrName>style.visibility</p:attrName>
-                                        </p:attrNameLst>
-                                      </p:cBhvr>
-                                      <p:to>
-                                        <p:strVal val="visible"/>
-                                      </p:to>
-                                    </p:set>
-                                    <p:animEffect transition="in" filter="wipe(left)">
-                                      <p:cBhvr>
-                                        <p:cTn id="10" dur="500"/>
-                                        <p:tgtEl>
-                                          <p:spTgt spid="4"/>
-                                        </p:tgtEl>
-                                      </p:cBhvr>
-                                    </p:animEffect>
-                                  </p:childTnLst>
-                                </p:cTn>
-                              </p:par>
-                            </p:childTnLst>
-                          </p:cTn>
-                        </p:par>
-                      </p:childTnLst>
-                    </p:cTn>
-                  </p:par>
-                </p:childTnLst>
-              </p:cTn>
-              <p:prevCondLst>
-                <p:cond evt="onPrev" delay="0">
-                  <p:tgtEl>
-                    <p:sldTgt/>
-                  </p:tgtEl>
-                </p:cond>
-              </p:prevCondLst>
-              <p:nextCondLst>
-                <p:cond evt="onNext" delay="0">
-                  <p:tgtEl>
-                    <p:sldTgt/>
-                  </p:tgtEl>
-                </p:cond>
-              </p:nextCondLst>
-            </p:seq>
-          </p:childTnLst>
-        </p:cTn>
-      </p:par>
-    </p:tnLst>
-    <p:bldLst>
-      <p:bldP spid="10" grpId="0" animBg="1"/>
-    </p:bldLst>
-  </p:timing>
-</p:sld>
-</file>
-
-<file path=ppt/slides/slide5.xml><?xml version="1.0" encoding="utf-8"?>
 <p:sld xmlns:a="http://schemas.openxmlformats.org/drawingml/2006/main" xmlns:r="http://schemas.openxmlformats.org/officeDocument/2006/relationships" xmlns:p="http://schemas.openxmlformats.org/presentationml/2006/main">
   <p:cSld>
     <p:spTree>
@@ -9346,7 +8347,7 @@
 </p:sld>
 </file>
 
-<file path=ppt/slides/slide6.xml><?xml version="1.0" encoding="utf-8"?>
+<file path=ppt/slides/slide4.xml><?xml version="1.0" encoding="utf-8"?>
 <p:sld xmlns:a="http://schemas.openxmlformats.org/drawingml/2006/main" xmlns:r="http://schemas.openxmlformats.org/officeDocument/2006/relationships" xmlns:p="http://schemas.openxmlformats.org/presentationml/2006/main">
   <p:cSld>
     <p:spTree>

</xml_diff>